<commit_message>
Finished V1.1, maybe extra cleaning needed of some details in the doc
</commit_message>
<xml_diff>
--- a/ElonMux/Logos/ElonMux.pptx
+++ b/ElonMux/Logos/ElonMux.pptx
@@ -8,6 +8,7 @@
     <p:sldId id="256" r:id="rId2"/>
     <p:sldId id="258" r:id="rId3"/>
     <p:sldId id="260" r:id="rId4"/>
+    <p:sldId id="261" r:id="rId5"/>
   </p:sldIdLst>
   <p:sldSz cx="12192000" cy="6858000"/>
   <p:notesSz cx="6858000" cy="9144000"/>
@@ -106,6 +107,11 @@
       </a:defRPr>
     </a:lvl9pPr>
   </p:defaultTextStyle>
+  <p:extLst>
+    <p:ext uri="{EFAFB233-063F-42B5-8137-9DF3F51BA10A}">
+      <p15:sldGuideLst xmlns:p15="http://schemas.microsoft.com/office/powerpoint/2012/main"/>
+    </p:ext>
+  </p:extLst>
 </p:presentation>
 </file>
 
@@ -256,7 +262,7 @@
           <a:p>
             <a:fld id="{6A2484DB-4FA8-9347-9BA0-755FC9C74DA1}" type="datetimeFigureOut">
               <a:rPr lang="fr-FR" smtClean="0"/>
-              <a:t>19/11/2024</a:t>
+              <a:t>16/07/2025</a:t>
             </a:fld>
             <a:endParaRPr lang="fr-FR"/>
           </a:p>
@@ -454,7 +460,7 @@
           <a:p>
             <a:fld id="{6A2484DB-4FA8-9347-9BA0-755FC9C74DA1}" type="datetimeFigureOut">
               <a:rPr lang="fr-FR" smtClean="0"/>
-              <a:t>19/11/2024</a:t>
+              <a:t>16/07/2025</a:t>
             </a:fld>
             <a:endParaRPr lang="fr-FR"/>
           </a:p>
@@ -662,7 +668,7 @@
           <a:p>
             <a:fld id="{6A2484DB-4FA8-9347-9BA0-755FC9C74DA1}" type="datetimeFigureOut">
               <a:rPr lang="fr-FR" smtClean="0"/>
-              <a:t>19/11/2024</a:t>
+              <a:t>16/07/2025</a:t>
             </a:fld>
             <a:endParaRPr lang="fr-FR"/>
           </a:p>
@@ -860,7 +866,7 @@
           <a:p>
             <a:fld id="{6A2484DB-4FA8-9347-9BA0-755FC9C74DA1}" type="datetimeFigureOut">
               <a:rPr lang="fr-FR" smtClean="0"/>
-              <a:t>19/11/2024</a:t>
+              <a:t>16/07/2025</a:t>
             </a:fld>
             <a:endParaRPr lang="fr-FR"/>
           </a:p>
@@ -1135,7 +1141,7 @@
           <a:p>
             <a:fld id="{6A2484DB-4FA8-9347-9BA0-755FC9C74DA1}" type="datetimeFigureOut">
               <a:rPr lang="fr-FR" smtClean="0"/>
-              <a:t>19/11/2024</a:t>
+              <a:t>16/07/2025</a:t>
             </a:fld>
             <a:endParaRPr lang="fr-FR"/>
           </a:p>
@@ -1400,7 +1406,7 @@
           <a:p>
             <a:fld id="{6A2484DB-4FA8-9347-9BA0-755FC9C74DA1}" type="datetimeFigureOut">
               <a:rPr lang="fr-FR" smtClean="0"/>
-              <a:t>19/11/2024</a:t>
+              <a:t>16/07/2025</a:t>
             </a:fld>
             <a:endParaRPr lang="fr-FR"/>
           </a:p>
@@ -1812,7 +1818,7 @@
           <a:p>
             <a:fld id="{6A2484DB-4FA8-9347-9BA0-755FC9C74DA1}" type="datetimeFigureOut">
               <a:rPr lang="fr-FR" smtClean="0"/>
-              <a:t>19/11/2024</a:t>
+              <a:t>16/07/2025</a:t>
             </a:fld>
             <a:endParaRPr lang="fr-FR"/>
           </a:p>
@@ -1953,7 +1959,7 @@
           <a:p>
             <a:fld id="{6A2484DB-4FA8-9347-9BA0-755FC9C74DA1}" type="datetimeFigureOut">
               <a:rPr lang="fr-FR" smtClean="0"/>
-              <a:t>19/11/2024</a:t>
+              <a:t>16/07/2025</a:t>
             </a:fld>
             <a:endParaRPr lang="fr-FR"/>
           </a:p>
@@ -2066,7 +2072,7 @@
           <a:p>
             <a:fld id="{6A2484DB-4FA8-9347-9BA0-755FC9C74DA1}" type="datetimeFigureOut">
               <a:rPr lang="fr-FR" smtClean="0"/>
-              <a:t>19/11/2024</a:t>
+              <a:t>16/07/2025</a:t>
             </a:fld>
             <a:endParaRPr lang="fr-FR"/>
           </a:p>
@@ -2377,7 +2383,7 @@
           <a:p>
             <a:fld id="{6A2484DB-4FA8-9347-9BA0-755FC9C74DA1}" type="datetimeFigureOut">
               <a:rPr lang="fr-FR" smtClean="0"/>
-              <a:t>19/11/2024</a:t>
+              <a:t>16/07/2025</a:t>
             </a:fld>
             <a:endParaRPr lang="fr-FR"/>
           </a:p>
@@ -2665,7 +2671,7 @@
           <a:p>
             <a:fld id="{6A2484DB-4FA8-9347-9BA0-755FC9C74DA1}" type="datetimeFigureOut">
               <a:rPr lang="fr-FR" smtClean="0"/>
-              <a:t>19/11/2024</a:t>
+              <a:t>16/07/2025</a:t>
             </a:fld>
             <a:endParaRPr lang="fr-FR"/>
           </a:p>
@@ -2906,7 +2912,7 @@
           <a:p>
             <a:fld id="{6A2484DB-4FA8-9347-9BA0-755FC9C74DA1}" type="datetimeFigureOut">
               <a:rPr lang="fr-FR" smtClean="0"/>
-              <a:t>19/11/2024</a:t>
+              <a:t>16/07/2025</a:t>
             </a:fld>
             <a:endParaRPr lang="fr-FR"/>
           </a:p>
@@ -4703,7 +4709,7 @@
             </a:extLst>
           </p:cNvPr>
           <p:cNvSpPr>
-            <a:spLocks/>
+            <a:spLocks noGrp="1"/>
           </p:cNvSpPr>
           <p:nvPr>
             <p:ph type="subTitle" idx="1"/>
@@ -4935,6 +4941,484 @@
     <p:extLst>
       <p:ext uri="{BB962C8B-B14F-4D97-AF65-F5344CB8AC3E}">
         <p14:creationId xmlns:p14="http://schemas.microsoft.com/office/powerpoint/2010/main" val="3303525775"/>
+      </p:ext>
+    </p:extLst>
+  </p:cSld>
+  <p:clrMapOvr>
+    <a:masterClrMapping/>
+  </p:clrMapOvr>
+</p:sld>
+</file>
+
+<file path=ppt/slides/slide4.xml><?xml version="1.0" encoding="utf-8"?>
+<p:sld xmlns:a="http://schemas.openxmlformats.org/drawingml/2006/main" xmlns:r="http://schemas.openxmlformats.org/officeDocument/2006/relationships" xmlns:p="http://schemas.openxmlformats.org/presentationml/2006/main">
+  <p:cSld>
+    <p:spTree>
+      <p:nvGrpSpPr>
+        <p:cNvPr id="1" name="">
+          <a:extLst>
+            <a:ext uri="{FF2B5EF4-FFF2-40B4-BE49-F238E27FC236}">
+              <a16:creationId xmlns:a16="http://schemas.microsoft.com/office/drawing/2014/main" id="{7EDF284D-DE2B-4B18-D4D7-9A8E290B8C07}"/>
+            </a:ext>
+          </a:extLst>
+        </p:cNvPr>
+        <p:cNvGrpSpPr/>
+        <p:nvPr/>
+      </p:nvGrpSpPr>
+      <p:grpSpPr>
+        <a:xfrm>
+          <a:off x="0" y="0"/>
+          <a:ext cx="0" cy="0"/>
+          <a:chOff x="0" y="0"/>
+          <a:chExt cx="0" cy="0"/>
+        </a:xfrm>
+      </p:grpSpPr>
+      <p:sp>
+        <p:nvSpPr>
+          <p:cNvPr id="3" name="Sous-titre 2">
+            <a:extLst>
+              <a:ext uri="{FF2B5EF4-FFF2-40B4-BE49-F238E27FC236}">
+                <a16:creationId xmlns:a16="http://schemas.microsoft.com/office/drawing/2014/main" id="{6F6A126C-A570-95D8-1D72-366C8B217748}"/>
+              </a:ext>
+            </a:extLst>
+          </p:cNvPr>
+          <p:cNvSpPr>
+            <a:spLocks/>
+          </p:cNvSpPr>
+          <p:nvPr>
+            <p:ph type="subTitle" idx="1"/>
+          </p:nvPr>
+        </p:nvSpPr>
+        <p:spPr>
+          <a:xfrm>
+            <a:off x="4837813" y="1836579"/>
+            <a:ext cx="2041635" cy="3184842"/>
+          </a:xfrm>
+        </p:spPr>
+        <p:txBody>
+          <a:bodyPr>
+            <a:noAutofit/>
+          </a:bodyPr>
+          <a:lstStyle/>
+          <a:p>
+            <a:r>
+              <a:rPr lang="fr-FR" sz="20000" dirty="0">
+                <a:latin typeface="Newton Howard Font" panose="02000506020000020004" pitchFamily="2" charset="0"/>
+              </a:rPr>
+              <a:t>E</a:t>
+            </a:r>
+          </a:p>
+        </p:txBody>
+      </p:sp>
+      <p:sp>
+        <p:nvSpPr>
+          <p:cNvPr id="5" name="Sous-titre 2">
+            <a:extLst>
+              <a:ext uri="{FF2B5EF4-FFF2-40B4-BE49-F238E27FC236}">
+                <a16:creationId xmlns:a16="http://schemas.microsoft.com/office/drawing/2014/main" id="{FF777C86-F236-475B-BD51-2F6B20746A4E}"/>
+              </a:ext>
+            </a:extLst>
+          </p:cNvPr>
+          <p:cNvSpPr txBox="1">
+            <a:spLocks/>
+          </p:cNvSpPr>
+          <p:nvPr/>
+        </p:nvSpPr>
+        <p:spPr>
+          <a:xfrm>
+            <a:off x="6200579" y="1836579"/>
+            <a:ext cx="2241856" cy="3184842"/>
+          </a:xfrm>
+          <a:prstGeom prst="rect">
+            <a:avLst/>
+          </a:prstGeom>
+        </p:spPr>
+        <p:txBody>
+          <a:bodyPr vert="horz" lIns="91440" tIns="45720" rIns="91440" bIns="45720" rtlCol="0">
+            <a:noAutofit/>
+          </a:bodyPr>
+          <a:lstStyle>
+            <a:lvl1pPr marL="0" indent="0" algn="ctr" defTabSz="914400" rtl="0" eaLnBrk="1" latinLnBrk="0" hangingPunct="1">
+              <a:lnSpc>
+                <a:spcPct val="90000"/>
+              </a:lnSpc>
+              <a:spcBef>
+                <a:spcPts val="1000"/>
+              </a:spcBef>
+              <a:buFont typeface="Arial" panose="020B0604020202020204" pitchFamily="34" charset="0"/>
+              <a:buNone/>
+              <a:defRPr sz="2400" kern="1200">
+                <a:solidFill>
+                  <a:schemeClr val="tx1"/>
+                </a:solidFill>
+                <a:latin typeface="+mn-lt"/>
+                <a:ea typeface="+mn-ea"/>
+                <a:cs typeface="+mn-cs"/>
+              </a:defRPr>
+            </a:lvl1pPr>
+            <a:lvl2pPr marL="457200" indent="0" algn="ctr" defTabSz="914400" rtl="0" eaLnBrk="1" latinLnBrk="0" hangingPunct="1">
+              <a:lnSpc>
+                <a:spcPct val="90000"/>
+              </a:lnSpc>
+              <a:spcBef>
+                <a:spcPts val="500"/>
+              </a:spcBef>
+              <a:buFont typeface="Arial" panose="020B0604020202020204" pitchFamily="34" charset="0"/>
+              <a:buNone/>
+              <a:defRPr sz="2000" kern="1200">
+                <a:solidFill>
+                  <a:schemeClr val="tx1"/>
+                </a:solidFill>
+                <a:latin typeface="+mn-lt"/>
+                <a:ea typeface="+mn-ea"/>
+                <a:cs typeface="+mn-cs"/>
+              </a:defRPr>
+            </a:lvl2pPr>
+            <a:lvl3pPr marL="914400" indent="0" algn="ctr" defTabSz="914400" rtl="0" eaLnBrk="1" latinLnBrk="0" hangingPunct="1">
+              <a:lnSpc>
+                <a:spcPct val="90000"/>
+              </a:lnSpc>
+              <a:spcBef>
+                <a:spcPts val="500"/>
+              </a:spcBef>
+              <a:buFont typeface="Arial" panose="020B0604020202020204" pitchFamily="34" charset="0"/>
+              <a:buNone/>
+              <a:defRPr sz="1800" kern="1200">
+                <a:solidFill>
+                  <a:schemeClr val="tx1"/>
+                </a:solidFill>
+                <a:latin typeface="+mn-lt"/>
+                <a:ea typeface="+mn-ea"/>
+                <a:cs typeface="+mn-cs"/>
+              </a:defRPr>
+            </a:lvl3pPr>
+            <a:lvl4pPr marL="1371600" indent="0" algn="ctr" defTabSz="914400" rtl="0" eaLnBrk="1" latinLnBrk="0" hangingPunct="1">
+              <a:lnSpc>
+                <a:spcPct val="90000"/>
+              </a:lnSpc>
+              <a:spcBef>
+                <a:spcPts val="500"/>
+              </a:spcBef>
+              <a:buFont typeface="Arial" panose="020B0604020202020204" pitchFamily="34" charset="0"/>
+              <a:buNone/>
+              <a:defRPr sz="1600" kern="1200">
+                <a:solidFill>
+                  <a:schemeClr val="tx1"/>
+                </a:solidFill>
+                <a:latin typeface="+mn-lt"/>
+                <a:ea typeface="+mn-ea"/>
+                <a:cs typeface="+mn-cs"/>
+              </a:defRPr>
+            </a:lvl4pPr>
+            <a:lvl5pPr marL="1828800" indent="0" algn="ctr" defTabSz="914400" rtl="0" eaLnBrk="1" latinLnBrk="0" hangingPunct="1">
+              <a:lnSpc>
+                <a:spcPct val="90000"/>
+              </a:lnSpc>
+              <a:spcBef>
+                <a:spcPts val="500"/>
+              </a:spcBef>
+              <a:buFont typeface="Arial" panose="020B0604020202020204" pitchFamily="34" charset="0"/>
+              <a:buNone/>
+              <a:defRPr sz="1600" kern="1200">
+                <a:solidFill>
+                  <a:schemeClr val="tx1"/>
+                </a:solidFill>
+                <a:latin typeface="+mn-lt"/>
+                <a:ea typeface="+mn-ea"/>
+                <a:cs typeface="+mn-cs"/>
+              </a:defRPr>
+            </a:lvl5pPr>
+            <a:lvl6pPr marL="2286000" indent="0" algn="ctr" defTabSz="914400" rtl="0" eaLnBrk="1" latinLnBrk="0" hangingPunct="1">
+              <a:lnSpc>
+                <a:spcPct val="90000"/>
+              </a:lnSpc>
+              <a:spcBef>
+                <a:spcPts val="500"/>
+              </a:spcBef>
+              <a:buFont typeface="Arial" panose="020B0604020202020204" pitchFamily="34" charset="0"/>
+              <a:buNone/>
+              <a:defRPr sz="1600" kern="1200">
+                <a:solidFill>
+                  <a:schemeClr val="tx1"/>
+                </a:solidFill>
+                <a:latin typeface="+mn-lt"/>
+                <a:ea typeface="+mn-ea"/>
+                <a:cs typeface="+mn-cs"/>
+              </a:defRPr>
+            </a:lvl6pPr>
+            <a:lvl7pPr marL="2743200" indent="0" algn="ctr" defTabSz="914400" rtl="0" eaLnBrk="1" latinLnBrk="0" hangingPunct="1">
+              <a:lnSpc>
+                <a:spcPct val="90000"/>
+              </a:lnSpc>
+              <a:spcBef>
+                <a:spcPts val="500"/>
+              </a:spcBef>
+              <a:buFont typeface="Arial" panose="020B0604020202020204" pitchFamily="34" charset="0"/>
+              <a:buNone/>
+              <a:defRPr sz="1600" kern="1200">
+                <a:solidFill>
+                  <a:schemeClr val="tx1"/>
+                </a:solidFill>
+                <a:latin typeface="+mn-lt"/>
+                <a:ea typeface="+mn-ea"/>
+                <a:cs typeface="+mn-cs"/>
+              </a:defRPr>
+            </a:lvl7pPr>
+            <a:lvl8pPr marL="3200400" indent="0" algn="ctr" defTabSz="914400" rtl="0" eaLnBrk="1" latinLnBrk="0" hangingPunct="1">
+              <a:lnSpc>
+                <a:spcPct val="90000"/>
+              </a:lnSpc>
+              <a:spcBef>
+                <a:spcPts val="500"/>
+              </a:spcBef>
+              <a:buFont typeface="Arial" panose="020B0604020202020204" pitchFamily="34" charset="0"/>
+              <a:buNone/>
+              <a:defRPr sz="1600" kern="1200">
+                <a:solidFill>
+                  <a:schemeClr val="tx1"/>
+                </a:solidFill>
+                <a:latin typeface="+mn-lt"/>
+                <a:ea typeface="+mn-ea"/>
+                <a:cs typeface="+mn-cs"/>
+              </a:defRPr>
+            </a:lvl8pPr>
+            <a:lvl9pPr marL="3657600" indent="0" algn="ctr" defTabSz="914400" rtl="0" eaLnBrk="1" latinLnBrk="0" hangingPunct="1">
+              <a:lnSpc>
+                <a:spcPct val="90000"/>
+              </a:lnSpc>
+              <a:spcBef>
+                <a:spcPts val="500"/>
+              </a:spcBef>
+              <a:buFont typeface="Arial" panose="020B0604020202020204" pitchFamily="34" charset="0"/>
+              <a:buNone/>
+              <a:defRPr sz="1600" kern="1200">
+                <a:solidFill>
+                  <a:schemeClr val="tx1"/>
+                </a:solidFill>
+                <a:latin typeface="+mn-lt"/>
+                <a:ea typeface="+mn-ea"/>
+                <a:cs typeface="+mn-cs"/>
+              </a:defRPr>
+            </a:lvl9pPr>
+          </a:lstStyle>
+          <a:p>
+            <a:r>
+              <a:rPr lang="fr-FR" sz="20000" dirty="0">
+                <a:solidFill>
+                  <a:srgbClr val="B2001C"/>
+                </a:solidFill>
+                <a:latin typeface="Newton Howard Font" panose="02000506020000020004" pitchFamily="2" charset="0"/>
+              </a:rPr>
+              <a:t>M</a:t>
+            </a:r>
+          </a:p>
+        </p:txBody>
+      </p:sp>
+      <p:sp>
+        <p:nvSpPr>
+          <p:cNvPr id="6" name="Sous-titre 2">
+            <a:extLst>
+              <a:ext uri="{FF2B5EF4-FFF2-40B4-BE49-F238E27FC236}">
+                <a16:creationId xmlns:a16="http://schemas.microsoft.com/office/drawing/2014/main" id="{F1DC8400-C353-52B6-E968-E0D50896CAF8}"/>
+              </a:ext>
+            </a:extLst>
+          </p:cNvPr>
+          <p:cNvSpPr txBox="1">
+            <a:spLocks noGrp="1" noRot="1" noMove="1" noResize="1" noEditPoints="1" noAdjustHandles="1" noChangeArrowheads="1" noChangeShapeType="1"/>
+          </p:cNvSpPr>
+          <p:nvPr/>
+        </p:nvSpPr>
+        <p:spPr>
+          <a:xfrm>
+            <a:off x="7726077" y="1979241"/>
+            <a:ext cx="3838377" cy="3184842"/>
+          </a:xfrm>
+          <a:prstGeom prst="rect">
+            <a:avLst/>
+          </a:prstGeom>
+        </p:spPr>
+        <p:txBody>
+          <a:bodyPr vert="horz" lIns="91440" tIns="45720" rIns="91440" bIns="45720" rtlCol="0">
+            <a:noAutofit/>
+          </a:bodyPr>
+          <a:lstStyle>
+            <a:lvl1pPr marL="0" indent="0" algn="ctr" defTabSz="914400" rtl="0" eaLnBrk="1" latinLnBrk="0" hangingPunct="1">
+              <a:lnSpc>
+                <a:spcPct val="90000"/>
+              </a:lnSpc>
+              <a:spcBef>
+                <a:spcPts val="1000"/>
+              </a:spcBef>
+              <a:buFont typeface="Arial" panose="020B0604020202020204" pitchFamily="34" charset="0"/>
+              <a:buNone/>
+              <a:defRPr sz="2400" kern="1200">
+                <a:solidFill>
+                  <a:schemeClr val="tx1"/>
+                </a:solidFill>
+                <a:latin typeface="+mn-lt"/>
+                <a:ea typeface="+mn-ea"/>
+                <a:cs typeface="+mn-cs"/>
+              </a:defRPr>
+            </a:lvl1pPr>
+            <a:lvl2pPr marL="457200" indent="0" algn="ctr" defTabSz="914400" rtl="0" eaLnBrk="1" latinLnBrk="0" hangingPunct="1">
+              <a:lnSpc>
+                <a:spcPct val="90000"/>
+              </a:lnSpc>
+              <a:spcBef>
+                <a:spcPts val="500"/>
+              </a:spcBef>
+              <a:buFont typeface="Arial" panose="020B0604020202020204" pitchFamily="34" charset="0"/>
+              <a:buNone/>
+              <a:defRPr sz="2000" kern="1200">
+                <a:solidFill>
+                  <a:schemeClr val="tx1"/>
+                </a:solidFill>
+                <a:latin typeface="+mn-lt"/>
+                <a:ea typeface="+mn-ea"/>
+                <a:cs typeface="+mn-cs"/>
+              </a:defRPr>
+            </a:lvl2pPr>
+            <a:lvl3pPr marL="914400" indent="0" algn="ctr" defTabSz="914400" rtl="0" eaLnBrk="1" latinLnBrk="0" hangingPunct="1">
+              <a:lnSpc>
+                <a:spcPct val="90000"/>
+              </a:lnSpc>
+              <a:spcBef>
+                <a:spcPts val="500"/>
+              </a:spcBef>
+              <a:buFont typeface="Arial" panose="020B0604020202020204" pitchFamily="34" charset="0"/>
+              <a:buNone/>
+              <a:defRPr sz="1800" kern="1200">
+                <a:solidFill>
+                  <a:schemeClr val="tx1"/>
+                </a:solidFill>
+                <a:latin typeface="+mn-lt"/>
+                <a:ea typeface="+mn-ea"/>
+                <a:cs typeface="+mn-cs"/>
+              </a:defRPr>
+            </a:lvl3pPr>
+            <a:lvl4pPr marL="1371600" indent="0" algn="ctr" defTabSz="914400" rtl="0" eaLnBrk="1" latinLnBrk="0" hangingPunct="1">
+              <a:lnSpc>
+                <a:spcPct val="90000"/>
+              </a:lnSpc>
+              <a:spcBef>
+                <a:spcPts val="500"/>
+              </a:spcBef>
+              <a:buFont typeface="Arial" panose="020B0604020202020204" pitchFamily="34" charset="0"/>
+              <a:buNone/>
+              <a:defRPr sz="1600" kern="1200">
+                <a:solidFill>
+                  <a:schemeClr val="tx1"/>
+                </a:solidFill>
+                <a:latin typeface="+mn-lt"/>
+                <a:ea typeface="+mn-ea"/>
+                <a:cs typeface="+mn-cs"/>
+              </a:defRPr>
+            </a:lvl4pPr>
+            <a:lvl5pPr marL="1828800" indent="0" algn="ctr" defTabSz="914400" rtl="0" eaLnBrk="1" latinLnBrk="0" hangingPunct="1">
+              <a:lnSpc>
+                <a:spcPct val="90000"/>
+              </a:lnSpc>
+              <a:spcBef>
+                <a:spcPts val="500"/>
+              </a:spcBef>
+              <a:buFont typeface="Arial" panose="020B0604020202020204" pitchFamily="34" charset="0"/>
+              <a:buNone/>
+              <a:defRPr sz="1600" kern="1200">
+                <a:solidFill>
+                  <a:schemeClr val="tx1"/>
+                </a:solidFill>
+                <a:latin typeface="+mn-lt"/>
+                <a:ea typeface="+mn-ea"/>
+                <a:cs typeface="+mn-cs"/>
+              </a:defRPr>
+            </a:lvl5pPr>
+            <a:lvl6pPr marL="2286000" indent="0" algn="ctr" defTabSz="914400" rtl="0" eaLnBrk="1" latinLnBrk="0" hangingPunct="1">
+              <a:lnSpc>
+                <a:spcPct val="90000"/>
+              </a:lnSpc>
+              <a:spcBef>
+                <a:spcPts val="500"/>
+              </a:spcBef>
+              <a:buFont typeface="Arial" panose="020B0604020202020204" pitchFamily="34" charset="0"/>
+              <a:buNone/>
+              <a:defRPr sz="1600" kern="1200">
+                <a:solidFill>
+                  <a:schemeClr val="tx1"/>
+                </a:solidFill>
+                <a:latin typeface="+mn-lt"/>
+                <a:ea typeface="+mn-ea"/>
+                <a:cs typeface="+mn-cs"/>
+              </a:defRPr>
+            </a:lvl6pPr>
+            <a:lvl7pPr marL="2743200" indent="0" algn="ctr" defTabSz="914400" rtl="0" eaLnBrk="1" latinLnBrk="0" hangingPunct="1">
+              <a:lnSpc>
+                <a:spcPct val="90000"/>
+              </a:lnSpc>
+              <a:spcBef>
+                <a:spcPts val="500"/>
+              </a:spcBef>
+              <a:buFont typeface="Arial" panose="020B0604020202020204" pitchFamily="34" charset="0"/>
+              <a:buNone/>
+              <a:defRPr sz="1600" kern="1200">
+                <a:solidFill>
+                  <a:schemeClr val="tx1"/>
+                </a:solidFill>
+                <a:latin typeface="+mn-lt"/>
+                <a:ea typeface="+mn-ea"/>
+                <a:cs typeface="+mn-cs"/>
+              </a:defRPr>
+            </a:lvl7pPr>
+            <a:lvl8pPr marL="3200400" indent="0" algn="ctr" defTabSz="914400" rtl="0" eaLnBrk="1" latinLnBrk="0" hangingPunct="1">
+              <a:lnSpc>
+                <a:spcPct val="90000"/>
+              </a:lnSpc>
+              <a:spcBef>
+                <a:spcPts val="500"/>
+              </a:spcBef>
+              <a:buFont typeface="Arial" panose="020B0604020202020204" pitchFamily="34" charset="0"/>
+              <a:buNone/>
+              <a:defRPr sz="1600" kern="1200">
+                <a:solidFill>
+                  <a:schemeClr val="tx1"/>
+                </a:solidFill>
+                <a:latin typeface="+mn-lt"/>
+                <a:ea typeface="+mn-ea"/>
+                <a:cs typeface="+mn-cs"/>
+              </a:defRPr>
+            </a:lvl8pPr>
+            <a:lvl9pPr marL="3657600" indent="0" algn="ctr" defTabSz="914400" rtl="0" eaLnBrk="1" latinLnBrk="0" hangingPunct="1">
+              <a:lnSpc>
+                <a:spcPct val="90000"/>
+              </a:lnSpc>
+              <a:spcBef>
+                <a:spcPts val="500"/>
+              </a:spcBef>
+              <a:buFont typeface="Arial" panose="020B0604020202020204" pitchFamily="34" charset="0"/>
+              <a:buNone/>
+              <a:defRPr sz="1600" kern="1200">
+                <a:solidFill>
+                  <a:schemeClr val="tx1"/>
+                </a:solidFill>
+                <a:latin typeface="+mn-lt"/>
+                <a:ea typeface="+mn-ea"/>
+                <a:cs typeface="+mn-cs"/>
+              </a:defRPr>
+            </a:lvl9pPr>
+          </a:lstStyle>
+          <a:p>
+            <a:r>
+              <a:rPr lang="fr-FR" sz="20000" dirty="0">
+                <a:latin typeface="Newton Howard Font" panose="02000506020000020004" pitchFamily="2" charset="0"/>
+              </a:rPr>
+              <a:t>ux</a:t>
+            </a:r>
+          </a:p>
+        </p:txBody>
+      </p:sp>
+    </p:spTree>
+    <p:extLst>
+      <p:ext uri="{BB962C8B-B14F-4D97-AF65-F5344CB8AC3E}">
+        <p14:creationId xmlns:p14="http://schemas.microsoft.com/office/powerpoint/2010/main" val="80587203"/>
       </p:ext>
     </p:extLst>
   </p:cSld>

</xml_diff>